<commit_message>
added slides as pdf
</commit_message>
<xml_diff>
--- a/internal/slides/Microbit-im-Unterricht.pptx
+++ b/internal/slides/Microbit-im-Unterricht.pptx
@@ -2,7 +2,7 @@
 <file path=ppt/presentation.xml><?xml version="1.0" encoding="utf-8"?>
 <p:presentation xmlns:a="http://schemas.openxmlformats.org/drawingml/2006/main" xmlns:r="http://schemas.openxmlformats.org/officeDocument/2006/relationships" xmlns:p="http://schemas.openxmlformats.org/presentationml/2006/main" saveSubsetFonts="1">
   <p:sldMasterIdLst>
-    <p:sldMasterId id="2147483660" r:id="rId1"/>
+    <p:sldMasterId id="2147483672" r:id="rId1"/>
   </p:sldMasterIdLst>
   <p:sldIdLst>
     <p:sldId id="265" r:id="rId2"/>
@@ -110,6 +110,11 @@
       </a:defRPr>
     </a:lvl9pPr>
   </p:defaultTextStyle>
+  <p:extLst>
+    <p:ext uri="{EFAFB233-063F-42B5-8137-9DF3F51BA10A}">
+      <p15:sldGuideLst xmlns:p15="http://schemas.microsoft.com/office/powerpoint/2012/main"/>
+    </p:ext>
+  </p:extLst>
 </p:presentation>
 </file>
 
@@ -119,7 +124,7 @@
     <p:bg>
       <p:bgPr>
         <a:solidFill>
-          <a:schemeClr val="bg2"/>
+          <a:schemeClr val="accent1"/>
         </a:solidFill>
         <a:effectLst/>
       </p:bgPr>
@@ -208,7 +213,11 @@
                 <a:spcPts val="0"/>
               </a:spcAft>
               <a:buNone/>
-              <a:defRPr sz="2300"/>
+              <a:defRPr sz="2300">
+                <a:solidFill>
+                  <a:schemeClr val="bg2"/>
+                </a:solidFill>
+              </a:defRPr>
             </a:lvl1pPr>
             <a:lvl2pPr marL="457200" indent="0" algn="ctr">
               <a:buNone/>
@@ -282,7 +291,7 @@
           <a:p>
             <a:fld id="{5B1B3FAA-B267-4063-859A-5458C166495D}" type="datetimeFigureOut">
               <a:rPr lang="de-AT" smtClean="0"/>
-              <a:t>29.04.2023</a:t>
+              <a:t>01.05.2023</a:t>
             </a:fld>
             <a:endParaRPr lang="de-AT"/>
           </a:p>
@@ -358,7 +367,7 @@
       </p:sp>
       <p:grpSp>
         <p:nvGrpSpPr>
-          <p:cNvPr id="7" name="Group 6"/>
+          <p:cNvPr id="9" name="Group 8"/>
           <p:cNvGrpSpPr/>
           <p:nvPr/>
         </p:nvGrpSpPr>
@@ -488,12 +497,12 @@
     </p:spTree>
     <p:extLst>
       <p:ext uri="{BB962C8B-B14F-4D97-AF65-F5344CB8AC3E}">
-        <p14:creationId xmlns:p14="http://schemas.microsoft.com/office/powerpoint/2010/main" val="929448757"/>
+        <p14:creationId xmlns:p14="http://schemas.microsoft.com/office/powerpoint/2010/main" val="272562489"/>
       </p:ext>
     </p:extLst>
   </p:cSld>
   <p:clrMapOvr>
-    <a:overrideClrMapping bg1="lt1" tx1="dk1" bg2="lt2" tx2="dk2" accent1="accent1" accent2="accent2" accent3="accent3" accent4="accent4" accent5="accent5" accent6="accent6" hlink="hlink" folHlink="folHlink"/>
+    <a:masterClrMapping/>
   </p:clrMapOvr>
 </p:sldLayout>
 </file>
@@ -612,7 +621,7 @@
           <a:p>
             <a:fld id="{5B1B3FAA-B267-4063-859A-5458C166495D}" type="datetimeFigureOut">
               <a:rPr lang="de-AT" smtClean="0"/>
-              <a:t>29.04.2023</a:t>
+              <a:t>01.05.2023</a:t>
             </a:fld>
             <a:endParaRPr lang="de-AT"/>
           </a:p>
@@ -663,7 +672,7 @@
     </p:spTree>
     <p:extLst>
       <p:ext uri="{BB962C8B-B14F-4D97-AF65-F5344CB8AC3E}">
-        <p14:creationId xmlns:p14="http://schemas.microsoft.com/office/powerpoint/2010/main" val="3768171208"/>
+        <p14:creationId xmlns:p14="http://schemas.microsoft.com/office/powerpoint/2010/main" val="4178602291"/>
       </p:ext>
     </p:extLst>
   </p:cSld>
@@ -792,7 +801,7 @@
           <a:p>
             <a:fld id="{5B1B3FAA-B267-4063-859A-5458C166495D}" type="datetimeFigureOut">
               <a:rPr lang="de-AT" smtClean="0"/>
-              <a:t>29.04.2023</a:t>
+              <a:t>01.05.2023</a:t>
             </a:fld>
             <a:endParaRPr lang="de-AT"/>
           </a:p>
@@ -843,7 +852,7 @@
     </p:spTree>
     <p:extLst>
       <p:ext uri="{BB962C8B-B14F-4D97-AF65-F5344CB8AC3E}">
-        <p14:creationId xmlns:p14="http://schemas.microsoft.com/office/powerpoint/2010/main" val="997425885"/>
+        <p14:creationId xmlns:p14="http://schemas.microsoft.com/office/powerpoint/2010/main" val="1977932907"/>
       </p:ext>
     </p:extLst>
   </p:cSld>
@@ -962,7 +971,7 @@
           <a:p>
             <a:fld id="{5B1B3FAA-B267-4063-859A-5458C166495D}" type="datetimeFigureOut">
               <a:rPr lang="de-AT" smtClean="0"/>
-              <a:t>29.04.2023</a:t>
+              <a:t>01.05.2023</a:t>
             </a:fld>
             <a:endParaRPr lang="de-AT"/>
           </a:p>
@@ -1013,7 +1022,7 @@
     </p:spTree>
     <p:extLst>
       <p:ext uri="{BB962C8B-B14F-4D97-AF65-F5344CB8AC3E}">
-        <p14:creationId xmlns:p14="http://schemas.microsoft.com/office/powerpoint/2010/main" val="1455400870"/>
+        <p14:creationId xmlns:p14="http://schemas.microsoft.com/office/powerpoint/2010/main" val="3169368683"/>
       </p:ext>
     </p:extLst>
   </p:cSld>
@@ -1069,7 +1078,7 @@
             <a:lvl1pPr algn="r">
               <a:defRPr sz="7200" cap="all" baseline="0">
                 <a:solidFill>
-                  <a:schemeClr val="tx2"/>
+                  <a:schemeClr val="accent1"/>
                 </a:solidFill>
               </a:defRPr>
             </a:lvl1pPr>
@@ -1239,7 +1248,7 @@
           <a:p>
             <a:fld id="{5B1B3FAA-B267-4063-859A-5458C166495D}" type="datetimeFigureOut">
               <a:rPr lang="de-AT" smtClean="0"/>
-              <a:t>29.04.2023</a:t>
+              <a:t>01.05.2023</a:t>
             </a:fld>
             <a:endParaRPr lang="de-AT"/>
           </a:p>
@@ -1358,7 +1367,7 @@
             </a:pathLst>
           </a:custGeom>
           <a:solidFill>
-            <a:schemeClr val="tx2"/>
+            <a:schemeClr val="accent1"/>
           </a:solidFill>
           <a:ln w="0">
             <a:noFill/>
@@ -1372,7 +1381,7 @@
     </p:spTree>
     <p:extLst>
       <p:ext uri="{BB962C8B-B14F-4D97-AF65-F5344CB8AC3E}">
-        <p14:creationId xmlns:p14="http://schemas.microsoft.com/office/powerpoint/2010/main" val="934961072"/>
+        <p14:creationId xmlns:p14="http://schemas.microsoft.com/office/powerpoint/2010/main" val="2093703375"/>
       </p:ext>
     </p:extLst>
   </p:cSld>
@@ -1633,7 +1642,7 @@
           <a:p>
             <a:fld id="{5B1B3FAA-B267-4063-859A-5458C166495D}" type="datetimeFigureOut">
               <a:rPr lang="de-AT" smtClean="0"/>
-              <a:t>29.04.2023</a:t>
+              <a:t>01.05.2023</a:t>
             </a:fld>
             <a:endParaRPr lang="de-AT"/>
           </a:p>
@@ -1684,7 +1693,7 @@
     </p:spTree>
     <p:extLst>
       <p:ext uri="{BB962C8B-B14F-4D97-AF65-F5344CB8AC3E}">
-        <p14:creationId xmlns:p14="http://schemas.microsoft.com/office/powerpoint/2010/main" val="2274562095"/>
+        <p14:creationId xmlns:p14="http://schemas.microsoft.com/office/powerpoint/2010/main" val="4032180260"/>
       </p:ext>
     </p:extLst>
   </p:cSld>
@@ -2110,7 +2119,7 @@
           <a:p>
             <a:fld id="{5B1B3FAA-B267-4063-859A-5458C166495D}" type="datetimeFigureOut">
               <a:rPr lang="de-AT" smtClean="0"/>
-              <a:t>29.04.2023</a:t>
+              <a:t>01.05.2023</a:t>
             </a:fld>
             <a:endParaRPr lang="de-AT"/>
           </a:p>
@@ -2161,7 +2170,7 @@
     </p:spTree>
     <p:extLst>
       <p:ext uri="{BB962C8B-B14F-4D97-AF65-F5344CB8AC3E}">
-        <p14:creationId xmlns:p14="http://schemas.microsoft.com/office/powerpoint/2010/main" val="3367607157"/>
+        <p14:creationId xmlns:p14="http://schemas.microsoft.com/office/powerpoint/2010/main" val="3269132912"/>
       </p:ext>
     </p:extLst>
   </p:cSld>
@@ -2228,7 +2237,7 @@
           <a:p>
             <a:fld id="{5B1B3FAA-B267-4063-859A-5458C166495D}" type="datetimeFigureOut">
               <a:rPr lang="de-AT" smtClean="0"/>
-              <a:t>29.04.2023</a:t>
+              <a:t>01.05.2023</a:t>
             </a:fld>
             <a:endParaRPr lang="de-AT"/>
           </a:p>
@@ -2279,7 +2288,7 @@
     </p:spTree>
     <p:extLst>
       <p:ext uri="{BB962C8B-B14F-4D97-AF65-F5344CB8AC3E}">
-        <p14:creationId xmlns:p14="http://schemas.microsoft.com/office/powerpoint/2010/main" val="686136773"/>
+        <p14:creationId xmlns:p14="http://schemas.microsoft.com/office/powerpoint/2010/main" val="3899401922"/>
       </p:ext>
     </p:extLst>
   </p:cSld>
@@ -2323,7 +2332,7 @@
           <a:p>
             <a:fld id="{5B1B3FAA-B267-4063-859A-5458C166495D}" type="datetimeFigureOut">
               <a:rPr lang="de-AT" smtClean="0"/>
-              <a:t>29.04.2023</a:t>
+              <a:t>01.05.2023</a:t>
             </a:fld>
             <a:endParaRPr lang="de-AT"/>
           </a:p>
@@ -2374,7 +2383,7 @@
     </p:spTree>
     <p:extLst>
       <p:ext uri="{BB962C8B-B14F-4D97-AF65-F5344CB8AC3E}">
-        <p14:creationId xmlns:p14="http://schemas.microsoft.com/office/powerpoint/2010/main" val="753657678"/>
+        <p14:creationId xmlns:p14="http://schemas.microsoft.com/office/powerpoint/2010/main" val="1450130575"/>
       </p:ext>
     </p:extLst>
   </p:cSld>
@@ -2669,7 +2678,7 @@
           <a:p>
             <a:fld id="{5B1B3FAA-B267-4063-859A-5458C166495D}" type="datetimeFigureOut">
               <a:rPr lang="de-AT" smtClean="0"/>
-              <a:t>29.04.2023</a:t>
+              <a:t>01.05.2023</a:t>
             </a:fld>
             <a:endParaRPr lang="de-AT"/>
           </a:p>
@@ -2784,7 +2793,7 @@
     </p:spTree>
     <p:extLst>
       <p:ext uri="{BB962C8B-B14F-4D97-AF65-F5344CB8AC3E}">
-        <p14:creationId xmlns:p14="http://schemas.microsoft.com/office/powerpoint/2010/main" val="1906625814"/>
+        <p14:creationId xmlns:p14="http://schemas.microsoft.com/office/powerpoint/2010/main" val="188360382"/>
       </p:ext>
     </p:extLst>
   </p:cSld>
@@ -3057,7 +3066,7 @@
           <a:p>
             <a:fld id="{5B1B3FAA-B267-4063-859A-5458C166495D}" type="datetimeFigureOut">
               <a:rPr lang="de-AT" smtClean="0"/>
-              <a:t>29.04.2023</a:t>
+              <a:t>01.05.2023</a:t>
             </a:fld>
             <a:endParaRPr lang="de-AT"/>
           </a:p>
@@ -3172,7 +3181,7 @@
     </p:spTree>
     <p:extLst>
       <p:ext uri="{BB962C8B-B14F-4D97-AF65-F5344CB8AC3E}">
-        <p14:creationId xmlns:p14="http://schemas.microsoft.com/office/powerpoint/2010/main" val="1250576482"/>
+        <p14:creationId xmlns:p14="http://schemas.microsoft.com/office/powerpoint/2010/main" val="4276761204"/>
       </p:ext>
     </p:extLst>
   </p:cSld>
@@ -3335,7 +3344,7 @@
           <a:p>
             <a:fld id="{5B1B3FAA-B267-4063-859A-5458C166495D}" type="datetimeFigureOut">
               <a:rPr lang="de-AT" smtClean="0"/>
-              <a:t>29.04.2023</a:t>
+              <a:t>01.05.2023</a:t>
             </a:fld>
             <a:endParaRPr lang="de-AT"/>
           </a:p>
@@ -3456,23 +3465,23 @@
     </p:spTree>
     <p:extLst>
       <p:ext uri="{BB962C8B-B14F-4D97-AF65-F5344CB8AC3E}">
-        <p14:creationId xmlns:p14="http://schemas.microsoft.com/office/powerpoint/2010/main" val="2241667147"/>
+        <p14:creationId xmlns:p14="http://schemas.microsoft.com/office/powerpoint/2010/main" val="2234624636"/>
       </p:ext>
     </p:extLst>
   </p:cSld>
   <p:clrMap bg1="lt1" tx1="dk1" bg2="lt2" tx2="dk2" accent1="accent1" accent2="accent2" accent3="accent3" accent4="accent4" accent5="accent5" accent6="accent6" hlink="hlink" folHlink="folHlink"/>
   <p:sldLayoutIdLst>
-    <p:sldLayoutId id="2147483661" r:id="rId1"/>
-    <p:sldLayoutId id="2147483662" r:id="rId2"/>
-    <p:sldLayoutId id="2147483663" r:id="rId3"/>
-    <p:sldLayoutId id="2147483664" r:id="rId4"/>
-    <p:sldLayoutId id="2147483665" r:id="rId5"/>
-    <p:sldLayoutId id="2147483666" r:id="rId6"/>
-    <p:sldLayoutId id="2147483667" r:id="rId7"/>
-    <p:sldLayoutId id="2147483668" r:id="rId8"/>
-    <p:sldLayoutId id="2147483669" r:id="rId9"/>
-    <p:sldLayoutId id="2147483670" r:id="rId10"/>
-    <p:sldLayoutId id="2147483671" r:id="rId11"/>
+    <p:sldLayoutId id="2147483673" r:id="rId1"/>
+    <p:sldLayoutId id="2147483674" r:id="rId2"/>
+    <p:sldLayoutId id="2147483675" r:id="rId3"/>
+    <p:sldLayoutId id="2147483676" r:id="rId4"/>
+    <p:sldLayoutId id="2147483677" r:id="rId5"/>
+    <p:sldLayoutId id="2147483678" r:id="rId6"/>
+    <p:sldLayoutId id="2147483679" r:id="rId7"/>
+    <p:sldLayoutId id="2147483680" r:id="rId8"/>
+    <p:sldLayoutId id="2147483681" r:id="rId9"/>
+    <p:sldLayoutId id="2147483682" r:id="rId10"/>
+    <p:sldLayoutId id="2147483683" r:id="rId11"/>
   </p:sldLayoutIdLst>
   <p:txStyles>
     <p:titleStyle>
@@ -5052,7 +5061,7 @@
   <a:extraClrSchemeLst/>
   <a:extLst>
     <a:ext uri="{05A4C25C-085E-4340-85A3-A5531E510DB2}">
-      <thm15:themeFamily xmlns:thm15="http://schemas.microsoft.com/office/thememl/2012/main" name="Crop" id="{EC9488ED-E761-4D60-9AC4-764D1FE2C171}" vid="{CE19780C-D67D-4C13-9DE9-A52BC3BA51B4}"/>
+      <thm15:themeFamily xmlns:thm15="http://schemas.microsoft.com/office/thememl/2012/main" name="Crop" id="{EC9488ED-E761-4D60-9AC4-764D1FE2C171}" vid="{D7AA1D6E-F3E9-4763-A3BC-84DF2E02F60F}"/>
     </a:ext>
   </a:extLst>
 </a:theme>

</xml_diff>